<commit_message>
removed Rob from items
</commit_message>
<xml_diff>
--- a/training/IntroductionToUML.pptx
+++ b/training/IntroductionToUML.pptx
@@ -162,6 +162,46 @@
       </a:defRPr>
     </a:lvl9pPr>
   </p:defaultTextStyle>
+  <p:extLst>
+    <p:ext uri="{EFAFB233-063F-42B5-8137-9DF3F51BA10A}">
+      <p15:sldGuideLst xmlns:p15="http://schemas.microsoft.com/office/powerpoint/2012/main">
+        <p15:guide id="1" orient="horz" pos="1207">
+          <p15:clr>
+            <a:srgbClr val="A4A3A4"/>
+          </p15:clr>
+        </p15:guide>
+        <p15:guide id="2" orient="horz" pos="3007">
+          <p15:clr>
+            <a:srgbClr val="A4A3A4"/>
+          </p15:clr>
+        </p15:guide>
+        <p15:guide id="3" orient="horz" pos="437">
+          <p15:clr>
+            <a:srgbClr val="A4A3A4"/>
+          </p15:clr>
+        </p15:guide>
+        <p15:guide id="4" pos="369">
+          <p15:clr>
+            <a:srgbClr val="A4A3A4"/>
+          </p15:clr>
+        </p15:guide>
+      </p15:sldGuideLst>
+    </p:ext>
+    <p:ext uri="{2D200454-40CA-4A62-9FC3-DE9A4176ACB9}">
+      <p15:notesGuideLst xmlns:p15="http://schemas.microsoft.com/office/powerpoint/2012/main">
+        <p15:guide id="1" orient="horz" pos="2905">
+          <p15:clr>
+            <a:srgbClr val="A4A3A4"/>
+          </p15:clr>
+        </p15:guide>
+        <p15:guide id="2" pos="2206">
+          <p15:clr>
+            <a:srgbClr val="A4A3A4"/>
+          </p15:clr>
+        </p15:guide>
+      </p15:notesGuideLst>
+    </p:ext>
+  </p:extLst>
 </p:presentation>
 </file>
 
@@ -1287,6 +1327,11 @@
         </p:txBody>
       </p:sp>
     </p:spTree>
+    <p:extLst>
+      <p:ext uri="{BB962C8B-B14F-4D97-AF65-F5344CB8AC3E}">
+        <p14:creationId xmlns:p14="http://schemas.microsoft.com/office/powerpoint/2010/main" val="4227686912"/>
+      </p:ext>
+    </p:extLst>
   </p:cSld>
   <p:clrMapOvr>
     <a:masterClrMapping/>
@@ -4066,7 +4111,7 @@
         <p:spPr>
           <a:xfrm>
             <a:off x="425450" y="4240213"/>
-            <a:ext cx="8293100" cy="609600"/>
+            <a:ext cx="8293100" cy="353943"/>
           </a:xfrm>
         </p:spPr>
         <p:txBody>
@@ -4074,17 +4119,7 @@
           <a:lstStyle/>
           <a:p>
             <a:pPr eaLnBrk="1" hangingPunct="1"/>
-            <a:r>
-              <a:rPr lang="en-US" smtClean="0"/>
-              <a:t>Rob Byrd</a:t>
-            </a:r>
-          </a:p>
-          <a:p>
-            <a:pPr eaLnBrk="1" hangingPunct="1"/>
-            <a:r>
-              <a:rPr lang="en-US" smtClean="0"/>
-              <a:t>rob.byrd@austintexas.gov</a:t>
-            </a:r>
+            <a:endParaRPr lang="en-US" dirty="0" smtClean="0"/>
           </a:p>
         </p:txBody>
       </p:sp>

</xml_diff>